<commit_message>
idk asi neco pridaneho
</commit_message>
<xml_diff>
--- a/SOC - prezentace - celostatko.pptx
+++ b/SOC - prezentace - celostatko.pptx
@@ -1140,7 +1140,7 @@
             </a:pPr>
             <a:r>
               <a:rPr lang="cs-CZ" dirty="0"/>
-              <a:t>Výsledkem mé středoškolské odborné práce je celkem 8 modelů schopných různé úrovně klasifikace. Práci jsem se snažil strukturovat tak, aby bylo možné celý proces jednoduše zopakovat. Kromě parametrů modelů a jejich výsledků jsem v práci nabídl i další možnosti, jak na trénink modelů navázat. </a:t>
+              <a:t>Výsledkem mé středoškolské odborné práce je osm modelů, které jsou schopny provádět klasifikaci na různých úrovních. Práci jsem se snažil strukturovat tak, aby byl celý proces trénování snadno pochopitelný a opakovatelný. Kromě parametrů modelů a jejich výsledků jsem v práci nabídl i další možnosti, jak na trénink modelů navázat. </a:t>
             </a:r>
           </a:p>
           <a:p>
@@ -4843,7 +4843,7 @@
         <p:spPr/>
         <p:txBody>
           <a:bodyPr>
-            <a:normAutofit fontScale="70000" lnSpcReduction="20000"/>
+            <a:normAutofit fontScale="85000" lnSpcReduction="20000"/>
           </a:bodyPr>
           <a:lstStyle/>
           <a:p>
@@ -4872,15 +4872,6 @@
               <a:rPr lang="cs-CZ" dirty="0"/>
               <a:t>https://www.mgplzen.cz/images/loga/logo_horizontalni.svg</a:t>
             </a:r>
-            <a:endParaRPr lang="cs-CZ" dirty="0">
-              <a:hlinkClick r:id="rId3"/>
-            </a:endParaRPr>
-          </a:p>
-          <a:p>
-            <a:r>
-              <a:rPr lang="cs-CZ" dirty="0"/>
-              <a:t>https://solarham.net/pictures/2024/mar24_2024_disk.jpg</a:t>
-            </a:r>
           </a:p>
           <a:p>
             <a:r>
@@ -4892,12 +4883,6 @@
             <a:r>
               <a:rPr lang="cs-CZ" dirty="0"/>
               <a:t>https://www.asu.cas.cz/~sunwatch/public/files/other/clanky/zonnevlekclassificatie-1.jpg </a:t>
-            </a:r>
-          </a:p>
-          <a:p>
-            <a:r>
-              <a:rPr lang="cs-CZ" dirty="0"/>
-              <a:t>https://upload.wikimedia.org/wikipedia/commons/thumb/4/46/Colored_neural_network.svg/1703px-Colored_neural_network.svg.png</a:t>
             </a:r>
           </a:p>
           <a:p>
@@ -6127,7 +6112,7 @@
           <a:p>
             <a:r>
               <a:rPr lang="cs-CZ" dirty="0"/>
-              <a:t>Slunce obecně, Kresba Slunce a McIntoshova klasifikace</a:t>
+              <a:t>Sluneční skvrny, Kresba Slunce a McIntoshova klasifikace</a:t>
             </a:r>
           </a:p>
         </p:txBody>

</xml_diff>